<commit_message>
fixes for "how to" ultra massive mega statistics improvements (kind of...)
</commit_message>
<xml_diff>
--- a/imagine_cup/virusX how to.pptx
+++ b/imagine_cup/virusX how to.pptx
@@ -4333,22 +4333,23 @@
               <a:t>Move your </a:t>
             </a:r>
             <a:r>
-              <a:rPr lang="en-US" sz="2800" dirty="0">
-                <a:latin typeface="Arial" pitchFamily="34" charset="0"/>
-                <a:cs typeface="Arial" pitchFamily="34" charset="0"/>
-              </a:rPr>
-              <a:t>V</a:t>
-            </a:r>
-            <a:r>
               <a:rPr lang="en-US" sz="2800" dirty="0" smtClean="0">
                 <a:latin typeface="Arial" pitchFamily="34" charset="0"/>
                 <a:cs typeface="Arial" pitchFamily="34" charset="0"/>
               </a:rPr>
-              <a:t>iruses</a:t>
+              <a:t>viruses</a:t>
             </a:r>
             <a:r>
               <a:rPr lang="en-US" sz="2800" dirty="0" smtClean="0"/>
-              <a:t> using your Cursor</a:t>
+              <a:t> </a:t>
+            </a:r>
+            <a:r>
+              <a:rPr lang="en-US" sz="2800" dirty="0" smtClean="0"/>
+              <a:t>using your </a:t>
+            </a:r>
+            <a:r>
+              <a:rPr lang="en-US" sz="2800" dirty="0" smtClean="0"/>
+              <a:t>cursor</a:t>
             </a:r>
             <a:endParaRPr lang="de-DE" sz="2800" dirty="0"/>
           </a:p>
@@ -4443,7 +4444,28 @@
                 <a:latin typeface="Arial" pitchFamily="34" charset="0"/>
                 <a:cs typeface="Arial" pitchFamily="34" charset="0"/>
               </a:rPr>
-              <a:t>Capture Cells by taking over Nuclei</a:t>
+              <a:t>Capture </a:t>
+            </a:r>
+            <a:r>
+              <a:rPr lang="en-US" sz="2800" dirty="0" smtClean="0">
+                <a:latin typeface="Arial" pitchFamily="34" charset="0"/>
+                <a:cs typeface="Arial" pitchFamily="34" charset="0"/>
+              </a:rPr>
+              <a:t>cells </a:t>
+            </a:r>
+            <a:r>
+              <a:rPr lang="en-US" sz="2800" dirty="0" smtClean="0">
+                <a:latin typeface="Arial" pitchFamily="34" charset="0"/>
+                <a:cs typeface="Arial" pitchFamily="34" charset="0"/>
+              </a:rPr>
+              <a:t>by taking over </a:t>
+            </a:r>
+            <a:r>
+              <a:rPr lang="en-US" sz="2800" dirty="0" smtClean="0">
+                <a:latin typeface="Arial" pitchFamily="34" charset="0"/>
+                <a:cs typeface="Arial" pitchFamily="34" charset="0"/>
+              </a:rPr>
+              <a:t>nuclei</a:t>
             </a:r>
             <a:endParaRPr lang="de-DE" sz="2800" dirty="0">
               <a:latin typeface="Arial" pitchFamily="34" charset="0"/>
@@ -4560,7 +4582,14 @@
                 <a:latin typeface="Arial" pitchFamily="34" charset="0"/>
                 <a:cs typeface="Arial" pitchFamily="34" charset="0"/>
               </a:rPr>
-              <a:t>Defeat your opponent’s Cells</a:t>
+              <a:t>Defeat your opponent’s </a:t>
+            </a:r>
+            <a:r>
+              <a:rPr lang="en-US" sz="2800" dirty="0" smtClean="0">
+                <a:latin typeface="Arial" pitchFamily="34" charset="0"/>
+                <a:cs typeface="Arial" pitchFamily="34" charset="0"/>
+              </a:rPr>
+              <a:t>cells</a:t>
             </a:r>
             <a:endParaRPr lang="de-DE" sz="2800" dirty="0">
               <a:latin typeface="Arial" pitchFamily="34" charset="0"/>
@@ -4697,7 +4726,21 @@
                 <a:latin typeface="Arial" pitchFamily="34" charset="0"/>
                 <a:cs typeface="Arial" pitchFamily="34" charset="0"/>
               </a:rPr>
-              <a:t>Use Items!</a:t>
+              <a:t>Use </a:t>
+            </a:r>
+            <a:r>
+              <a:rPr lang="en-US" sz="2800" dirty="0" smtClean="0">
+                <a:latin typeface="Arial" pitchFamily="34" charset="0"/>
+                <a:cs typeface="Arial" pitchFamily="34" charset="0"/>
+              </a:rPr>
+              <a:t>items</a:t>
+            </a:r>
+            <a:r>
+              <a:rPr lang="en-US" sz="2800" dirty="0" smtClean="0">
+                <a:latin typeface="Arial" pitchFamily="34" charset="0"/>
+                <a:cs typeface="Arial" pitchFamily="34" charset="0"/>
+              </a:rPr>
+              <a:t>!</a:t>
             </a:r>
             <a:endParaRPr lang="de-DE" sz="2800" dirty="0">
               <a:latin typeface="Arial" pitchFamily="34" charset="0"/>
@@ -4782,7 +4825,21 @@
                 <a:latin typeface="Arial" pitchFamily="34" charset="0"/>
                 <a:cs typeface="Arial" pitchFamily="34" charset="0"/>
               </a:rPr>
-              <a:t>ollected Items are shown in your corner</a:t>
+              <a:t>ollected </a:t>
+            </a:r>
+            <a:r>
+              <a:rPr lang="en-US" sz="2800" dirty="0" smtClean="0">
+                <a:latin typeface="Arial" pitchFamily="34" charset="0"/>
+                <a:cs typeface="Arial" pitchFamily="34" charset="0"/>
+              </a:rPr>
+              <a:t>items </a:t>
+            </a:r>
+            <a:r>
+              <a:rPr lang="en-US" sz="2800" dirty="0" smtClean="0">
+                <a:latin typeface="Arial" pitchFamily="34" charset="0"/>
+                <a:cs typeface="Arial" pitchFamily="34" charset="0"/>
+              </a:rPr>
+              <a:t>are shown in your corner</a:t>
             </a:r>
             <a:endParaRPr lang="de-DE" sz="2800" dirty="0">
               <a:latin typeface="Arial" pitchFamily="34" charset="0"/>
@@ -4880,7 +4937,21 @@
                 <a:latin typeface="Arial" pitchFamily="34" charset="0"/>
                 <a:cs typeface="Arial" pitchFamily="34" charset="0"/>
               </a:rPr>
-              <a:t>Gather Items!</a:t>
+              <a:t>Gather </a:t>
+            </a:r>
+            <a:r>
+              <a:rPr lang="en-US" sz="2800" dirty="0" smtClean="0">
+                <a:latin typeface="Arial" pitchFamily="34" charset="0"/>
+                <a:cs typeface="Arial" pitchFamily="34" charset="0"/>
+              </a:rPr>
+              <a:t>items</a:t>
+            </a:r>
+            <a:r>
+              <a:rPr lang="en-US" sz="2800" dirty="0" smtClean="0">
+                <a:latin typeface="Arial" pitchFamily="34" charset="0"/>
+                <a:cs typeface="Arial" pitchFamily="34" charset="0"/>
+              </a:rPr>
+              <a:t>!</a:t>
             </a:r>
             <a:endParaRPr lang="de-DE" sz="2800" dirty="0">
               <a:latin typeface="Arial" pitchFamily="34" charset="0"/>
@@ -5054,7 +5125,14 @@
                 <a:latin typeface="Arial" pitchFamily="34" charset="0"/>
                 <a:cs typeface="Arial" pitchFamily="34" charset="0"/>
               </a:rPr>
-              <a:t>Safe Zone	- kills opponent’s Virus</a:t>
+              <a:t>Safe Zone	- kills opponent’s </a:t>
+            </a:r>
+            <a:r>
+              <a:rPr lang="en-US" sz="2800" dirty="0" smtClean="0">
+                <a:latin typeface="Arial" pitchFamily="34" charset="0"/>
+                <a:cs typeface="Arial" pitchFamily="34" charset="0"/>
+              </a:rPr>
+              <a:t>virus</a:t>
             </a:r>
             <a:endParaRPr lang="de-DE" sz="2800" dirty="0">
               <a:latin typeface="Arial" pitchFamily="34" charset="0"/>
@@ -5130,7 +5208,21 @@
                 <a:latin typeface="Arial" pitchFamily="34" charset="0"/>
                 <a:cs typeface="Arial" pitchFamily="34" charset="0"/>
               </a:rPr>
-              <a:t>Wipe Out	- nearly all Viruses die</a:t>
+              <a:t>Wipe Out	- nearly all </a:t>
+            </a:r>
+            <a:r>
+              <a:rPr lang="en-US" sz="2800" dirty="0" smtClean="0">
+                <a:latin typeface="Arial" pitchFamily="34" charset="0"/>
+                <a:cs typeface="Arial" pitchFamily="34" charset="0"/>
+              </a:rPr>
+              <a:t>viruses </a:t>
+            </a:r>
+            <a:r>
+              <a:rPr lang="en-US" sz="2800" dirty="0" smtClean="0">
+                <a:latin typeface="Arial" pitchFamily="34" charset="0"/>
+                <a:cs typeface="Arial" pitchFamily="34" charset="0"/>
+              </a:rPr>
+              <a:t>die</a:t>
             </a:r>
             <a:endParaRPr lang="de-DE" sz="2800" dirty="0">
               <a:latin typeface="Arial" pitchFamily="34" charset="0"/>
@@ -5168,7 +5260,14 @@
                 <a:latin typeface="Arial" pitchFamily="34" charset="0"/>
                 <a:cs typeface="Arial" pitchFamily="34" charset="0"/>
               </a:rPr>
-              <a:t>Anti Body	- kills nearby Viruses</a:t>
+              <a:t>Anti Body	- kills nearby </a:t>
+            </a:r>
+            <a:r>
+              <a:rPr lang="en-US" sz="2800" dirty="0" smtClean="0">
+                <a:latin typeface="Arial" pitchFamily="34" charset="0"/>
+                <a:cs typeface="Arial" pitchFamily="34" charset="0"/>
+              </a:rPr>
+              <a:t>viruses</a:t>
             </a:r>
             <a:endParaRPr lang="de-DE" sz="2800" dirty="0">
               <a:latin typeface="Arial" pitchFamily="34" charset="0"/>
@@ -5304,7 +5403,14 @@
                 <a:latin typeface="Arial" pitchFamily="34" charset="0"/>
                 <a:cs typeface="Arial" pitchFamily="34" charset="0"/>
               </a:rPr>
-              <a:t>Kill all enemy Viruses</a:t>
+              <a:t>Kill all enemy </a:t>
+            </a:r>
+            <a:r>
+              <a:rPr lang="en-US" sz="2800" dirty="0" smtClean="0">
+                <a:latin typeface="Arial" pitchFamily="34" charset="0"/>
+                <a:cs typeface="Arial" pitchFamily="34" charset="0"/>
+              </a:rPr>
+              <a:t>viruses</a:t>
             </a:r>
             <a:endParaRPr lang="de-DE" sz="2800" dirty="0">
               <a:latin typeface="Arial" pitchFamily="34" charset="0"/>
@@ -5519,7 +5625,28 @@
                 <a:latin typeface="Arial" pitchFamily="34" charset="0"/>
                 <a:cs typeface="Arial" pitchFamily="34" charset="0"/>
               </a:rPr>
-              <a:t>Hold-Move to separate Virus-aim and Cursor</a:t>
+              <a:t>Hold-Move to separate </a:t>
+            </a:r>
+            <a:r>
+              <a:rPr lang="en-US" sz="2800" dirty="0" smtClean="0">
+                <a:latin typeface="Arial" pitchFamily="34" charset="0"/>
+                <a:cs typeface="Arial" pitchFamily="34" charset="0"/>
+              </a:rPr>
+              <a:t>virus-aim </a:t>
+            </a:r>
+            <a:r>
+              <a:rPr lang="en-US" sz="2800" dirty="0" smtClean="0">
+                <a:latin typeface="Arial" pitchFamily="34" charset="0"/>
+                <a:cs typeface="Arial" pitchFamily="34" charset="0"/>
+              </a:rPr>
+              <a:t>and </a:t>
+            </a:r>
+            <a:r>
+              <a:rPr lang="en-US" sz="2800" dirty="0" smtClean="0">
+                <a:latin typeface="Arial" pitchFamily="34" charset="0"/>
+                <a:cs typeface="Arial" pitchFamily="34" charset="0"/>
+              </a:rPr>
+              <a:t>cursor</a:t>
             </a:r>
             <a:endParaRPr lang="de-DE" sz="2800" dirty="0">
               <a:latin typeface="Arial" pitchFamily="34" charset="0"/>

</xml_diff>

<commit_message>
bugfix in virusX how to
</commit_message>
<xml_diff>
--- a/imagine_cup/virusX how to.pptx
+++ b/imagine_cup/virusX how to.pptx
@@ -4029,8 +4029,16 @@
           <a:lstStyle/>
           <a:p>
             <a:r>
+              <a:rPr lang="en-US" sz="2800" smtClean="0"/>
+              <a:t>Invite </a:t>
+            </a:r>
+            <a:r>
+              <a:rPr lang="en-US" sz="2800" smtClean="0"/>
+              <a:t>1-3 </a:t>
+            </a:r>
+            <a:r>
               <a:rPr lang="en-US" sz="2800" dirty="0" smtClean="0"/>
-              <a:t>Invite 2-3 friends</a:t>
+              <a:t>friends</a:t>
             </a:r>
             <a:endParaRPr lang="de-DE" sz="2800" dirty="0"/>
           </a:p>
@@ -4341,15 +4349,7 @@
             </a:r>
             <a:r>
               <a:rPr lang="en-US" sz="2800" dirty="0" smtClean="0"/>
-              <a:t> </a:t>
-            </a:r>
-            <a:r>
-              <a:rPr lang="en-US" sz="2800" dirty="0" smtClean="0"/>
-              <a:t>using your </a:t>
-            </a:r>
-            <a:r>
-              <a:rPr lang="en-US" sz="2800" dirty="0" smtClean="0"/>
-              <a:t>cursor</a:t>
+              <a:t> using your cursor</a:t>
             </a:r>
             <a:endParaRPr lang="de-DE" sz="2800" dirty="0"/>
           </a:p>
@@ -4444,28 +4444,7 @@
                 <a:latin typeface="Arial" pitchFamily="34" charset="0"/>
                 <a:cs typeface="Arial" pitchFamily="34" charset="0"/>
               </a:rPr>
-              <a:t>Capture </a:t>
-            </a:r>
-            <a:r>
-              <a:rPr lang="en-US" sz="2800" dirty="0" smtClean="0">
-                <a:latin typeface="Arial" pitchFamily="34" charset="0"/>
-                <a:cs typeface="Arial" pitchFamily="34" charset="0"/>
-              </a:rPr>
-              <a:t>cells </a:t>
-            </a:r>
-            <a:r>
-              <a:rPr lang="en-US" sz="2800" dirty="0" smtClean="0">
-                <a:latin typeface="Arial" pitchFamily="34" charset="0"/>
-                <a:cs typeface="Arial" pitchFamily="34" charset="0"/>
-              </a:rPr>
-              <a:t>by taking over </a:t>
-            </a:r>
-            <a:r>
-              <a:rPr lang="en-US" sz="2800" dirty="0" smtClean="0">
-                <a:latin typeface="Arial" pitchFamily="34" charset="0"/>
-                <a:cs typeface="Arial" pitchFamily="34" charset="0"/>
-              </a:rPr>
-              <a:t>nuclei</a:t>
+              <a:t>Capture cells by taking over nuclei</a:t>
             </a:r>
             <a:endParaRPr lang="de-DE" sz="2800" dirty="0">
               <a:latin typeface="Arial" pitchFamily="34" charset="0"/>
@@ -4582,14 +4561,7 @@
                 <a:latin typeface="Arial" pitchFamily="34" charset="0"/>
                 <a:cs typeface="Arial" pitchFamily="34" charset="0"/>
               </a:rPr>
-              <a:t>Defeat your opponent’s </a:t>
-            </a:r>
-            <a:r>
-              <a:rPr lang="en-US" sz="2800" dirty="0" smtClean="0">
-                <a:latin typeface="Arial" pitchFamily="34" charset="0"/>
-                <a:cs typeface="Arial" pitchFamily="34" charset="0"/>
-              </a:rPr>
-              <a:t>cells</a:t>
+              <a:t>Defeat your opponent’s cells</a:t>
             </a:r>
             <a:endParaRPr lang="de-DE" sz="2800" dirty="0">
               <a:latin typeface="Arial" pitchFamily="34" charset="0"/>
@@ -4726,21 +4698,7 @@
                 <a:latin typeface="Arial" pitchFamily="34" charset="0"/>
                 <a:cs typeface="Arial" pitchFamily="34" charset="0"/>
               </a:rPr>
-              <a:t>Use </a:t>
-            </a:r>
-            <a:r>
-              <a:rPr lang="en-US" sz="2800" dirty="0" smtClean="0">
-                <a:latin typeface="Arial" pitchFamily="34" charset="0"/>
-                <a:cs typeface="Arial" pitchFamily="34" charset="0"/>
-              </a:rPr>
-              <a:t>items</a:t>
-            </a:r>
-            <a:r>
-              <a:rPr lang="en-US" sz="2800" dirty="0" smtClean="0">
-                <a:latin typeface="Arial" pitchFamily="34" charset="0"/>
-                <a:cs typeface="Arial" pitchFamily="34" charset="0"/>
-              </a:rPr>
-              <a:t>!</a:t>
+              <a:t>Use items!</a:t>
             </a:r>
             <a:endParaRPr lang="de-DE" sz="2800" dirty="0">
               <a:latin typeface="Arial" pitchFamily="34" charset="0"/>
@@ -4825,21 +4783,7 @@
                 <a:latin typeface="Arial" pitchFamily="34" charset="0"/>
                 <a:cs typeface="Arial" pitchFamily="34" charset="0"/>
               </a:rPr>
-              <a:t>ollected </a:t>
-            </a:r>
-            <a:r>
-              <a:rPr lang="en-US" sz="2800" dirty="0" smtClean="0">
-                <a:latin typeface="Arial" pitchFamily="34" charset="0"/>
-                <a:cs typeface="Arial" pitchFamily="34" charset="0"/>
-              </a:rPr>
-              <a:t>items </a:t>
-            </a:r>
-            <a:r>
-              <a:rPr lang="en-US" sz="2800" dirty="0" smtClean="0">
-                <a:latin typeface="Arial" pitchFamily="34" charset="0"/>
-                <a:cs typeface="Arial" pitchFamily="34" charset="0"/>
-              </a:rPr>
-              <a:t>are shown in your corner</a:t>
+              <a:t>ollected items are shown in your corner</a:t>
             </a:r>
             <a:endParaRPr lang="de-DE" sz="2800" dirty="0">
               <a:latin typeface="Arial" pitchFamily="34" charset="0"/>
@@ -4937,21 +4881,7 @@
                 <a:latin typeface="Arial" pitchFamily="34" charset="0"/>
                 <a:cs typeface="Arial" pitchFamily="34" charset="0"/>
               </a:rPr>
-              <a:t>Gather </a:t>
-            </a:r>
-            <a:r>
-              <a:rPr lang="en-US" sz="2800" dirty="0" smtClean="0">
-                <a:latin typeface="Arial" pitchFamily="34" charset="0"/>
-                <a:cs typeface="Arial" pitchFamily="34" charset="0"/>
-              </a:rPr>
-              <a:t>items</a:t>
-            </a:r>
-            <a:r>
-              <a:rPr lang="en-US" sz="2800" dirty="0" smtClean="0">
-                <a:latin typeface="Arial" pitchFamily="34" charset="0"/>
-                <a:cs typeface="Arial" pitchFamily="34" charset="0"/>
-              </a:rPr>
-              <a:t>!</a:t>
+              <a:t>Gather items!</a:t>
             </a:r>
             <a:endParaRPr lang="de-DE" sz="2800" dirty="0">
               <a:latin typeface="Arial" pitchFamily="34" charset="0"/>
@@ -5125,14 +5055,7 @@
                 <a:latin typeface="Arial" pitchFamily="34" charset="0"/>
                 <a:cs typeface="Arial" pitchFamily="34" charset="0"/>
               </a:rPr>
-              <a:t>Safe Zone	- kills opponent’s </a:t>
-            </a:r>
-            <a:r>
-              <a:rPr lang="en-US" sz="2800" dirty="0" smtClean="0">
-                <a:latin typeface="Arial" pitchFamily="34" charset="0"/>
-                <a:cs typeface="Arial" pitchFamily="34" charset="0"/>
-              </a:rPr>
-              <a:t>virus</a:t>
+              <a:t>Safe Zone	- kills opponent’s virus</a:t>
             </a:r>
             <a:endParaRPr lang="de-DE" sz="2800" dirty="0">
               <a:latin typeface="Arial" pitchFamily="34" charset="0"/>
@@ -5208,21 +5131,7 @@
                 <a:latin typeface="Arial" pitchFamily="34" charset="0"/>
                 <a:cs typeface="Arial" pitchFamily="34" charset="0"/>
               </a:rPr>
-              <a:t>Wipe Out	- nearly all </a:t>
-            </a:r>
-            <a:r>
-              <a:rPr lang="en-US" sz="2800" dirty="0" smtClean="0">
-                <a:latin typeface="Arial" pitchFamily="34" charset="0"/>
-                <a:cs typeface="Arial" pitchFamily="34" charset="0"/>
-              </a:rPr>
-              <a:t>viruses </a:t>
-            </a:r>
-            <a:r>
-              <a:rPr lang="en-US" sz="2800" dirty="0" smtClean="0">
-                <a:latin typeface="Arial" pitchFamily="34" charset="0"/>
-                <a:cs typeface="Arial" pitchFamily="34" charset="0"/>
-              </a:rPr>
-              <a:t>die</a:t>
+              <a:t>Wipe Out	- nearly all viruses die</a:t>
             </a:r>
             <a:endParaRPr lang="de-DE" sz="2800" dirty="0">
               <a:latin typeface="Arial" pitchFamily="34" charset="0"/>
@@ -5260,14 +5169,7 @@
                 <a:latin typeface="Arial" pitchFamily="34" charset="0"/>
                 <a:cs typeface="Arial" pitchFamily="34" charset="0"/>
               </a:rPr>
-              <a:t>Anti Body	- kills nearby </a:t>
-            </a:r>
-            <a:r>
-              <a:rPr lang="en-US" sz="2800" dirty="0" smtClean="0">
-                <a:latin typeface="Arial" pitchFamily="34" charset="0"/>
-                <a:cs typeface="Arial" pitchFamily="34" charset="0"/>
-              </a:rPr>
-              <a:t>viruses</a:t>
+              <a:t>Anti Body	- kills nearby viruses</a:t>
             </a:r>
             <a:endParaRPr lang="de-DE" sz="2800" dirty="0">
               <a:latin typeface="Arial" pitchFamily="34" charset="0"/>
@@ -5403,14 +5305,7 @@
                 <a:latin typeface="Arial" pitchFamily="34" charset="0"/>
                 <a:cs typeface="Arial" pitchFamily="34" charset="0"/>
               </a:rPr>
-              <a:t>Kill all enemy </a:t>
-            </a:r>
-            <a:r>
-              <a:rPr lang="en-US" sz="2800" dirty="0" smtClean="0">
-                <a:latin typeface="Arial" pitchFamily="34" charset="0"/>
-                <a:cs typeface="Arial" pitchFamily="34" charset="0"/>
-              </a:rPr>
-              <a:t>viruses</a:t>
+              <a:t>Kill all enemy viruses</a:t>
             </a:r>
             <a:endParaRPr lang="de-DE" sz="2800" dirty="0">
               <a:latin typeface="Arial" pitchFamily="34" charset="0"/>
@@ -5625,28 +5520,7 @@
                 <a:latin typeface="Arial" pitchFamily="34" charset="0"/>
                 <a:cs typeface="Arial" pitchFamily="34" charset="0"/>
               </a:rPr>
-              <a:t>Hold-Move to separate </a:t>
-            </a:r>
-            <a:r>
-              <a:rPr lang="en-US" sz="2800" dirty="0" smtClean="0">
-                <a:latin typeface="Arial" pitchFamily="34" charset="0"/>
-                <a:cs typeface="Arial" pitchFamily="34" charset="0"/>
-              </a:rPr>
-              <a:t>virus-aim </a:t>
-            </a:r>
-            <a:r>
-              <a:rPr lang="en-US" sz="2800" dirty="0" smtClean="0">
-                <a:latin typeface="Arial" pitchFamily="34" charset="0"/>
-                <a:cs typeface="Arial" pitchFamily="34" charset="0"/>
-              </a:rPr>
-              <a:t>and </a:t>
-            </a:r>
-            <a:r>
-              <a:rPr lang="en-US" sz="2800" dirty="0" smtClean="0">
-                <a:latin typeface="Arial" pitchFamily="34" charset="0"/>
-                <a:cs typeface="Arial" pitchFamily="34" charset="0"/>
-              </a:rPr>
-              <a:t>cursor</a:t>
+              <a:t>Hold-Move to separate virus-aim and cursor</a:t>
             </a:r>
             <a:endParaRPr lang="de-DE" sz="2800" dirty="0">
               <a:latin typeface="Arial" pitchFamily="34" charset="0"/>

</xml_diff>

<commit_message>
some fixes for how to
</commit_message>
<xml_diff>
--- a/imagine_cup/virusX how to.pptx
+++ b/imagine_cup/virusX how to.pptx
@@ -3933,10 +3933,16 @@
           <a:lstStyle/>
           <a:p>
             <a:r>
-              <a:rPr lang="en-US" sz="2800" dirty="0" smtClean="0"/>
+              <a:rPr lang="en-US" sz="2800" dirty="0" smtClean="0">
+                <a:latin typeface="Arial" pitchFamily="34" charset="0"/>
+                <a:cs typeface="Arial" pitchFamily="34" charset="0"/>
+              </a:rPr>
               <a:t>The Game requires .NET 4.0 and XNA4</a:t>
             </a:r>
-            <a:endParaRPr lang="de-DE" sz="2800" dirty="0"/>
+            <a:endParaRPr lang="de-DE" sz="2800" dirty="0">
+              <a:latin typeface="Arial" pitchFamily="34" charset="0"/>
+              <a:cs typeface="Arial" pitchFamily="34" charset="0"/>
+            </a:endParaRPr>
           </a:p>
         </p:txBody>
       </p:sp>
@@ -3965,10 +3971,16 @@
           <a:lstStyle/>
           <a:p>
             <a:r>
-              <a:rPr lang="en-US" sz="2800" dirty="0" smtClean="0"/>
+              <a:rPr lang="en-US" sz="2800" dirty="0" smtClean="0">
+                <a:latin typeface="Arial" pitchFamily="34" charset="0"/>
+                <a:cs typeface="Arial" pitchFamily="34" charset="0"/>
+              </a:rPr>
               <a:t>A XNA4 Installer is contained in the Zip</a:t>
             </a:r>
-            <a:endParaRPr lang="de-DE" sz="2800" dirty="0"/>
+            <a:endParaRPr lang="de-DE" sz="2800" dirty="0">
+              <a:latin typeface="Arial" pitchFamily="34" charset="0"/>
+              <a:cs typeface="Arial" pitchFamily="34" charset="0"/>
+            </a:endParaRPr>
           </a:p>
         </p:txBody>
       </p:sp>
@@ -3997,10 +4009,16 @@
           <a:lstStyle/>
           <a:p>
             <a:r>
-              <a:rPr lang="en-US" sz="2800" dirty="0" smtClean="0"/>
+              <a:rPr lang="en-US" sz="2800" dirty="0" smtClean="0">
+                <a:latin typeface="Arial" pitchFamily="34" charset="0"/>
+                <a:cs typeface="Arial" pitchFamily="34" charset="0"/>
+              </a:rPr>
               <a:t>Extract Zip</a:t>
             </a:r>
-            <a:endParaRPr lang="de-DE" sz="2800" dirty="0"/>
+            <a:endParaRPr lang="de-DE" sz="2800" dirty="0">
+              <a:latin typeface="Arial" pitchFamily="34" charset="0"/>
+              <a:cs typeface="Arial" pitchFamily="34" charset="0"/>
+            </a:endParaRPr>
           </a:p>
         </p:txBody>
       </p:sp>
@@ -4029,18 +4047,30 @@
           <a:lstStyle/>
           <a:p>
             <a:r>
-              <a:rPr lang="en-US" sz="2800" smtClean="0"/>
+              <a:rPr lang="en-US" sz="2800" dirty="0" smtClean="0">
+                <a:latin typeface="Arial" pitchFamily="34" charset="0"/>
+                <a:cs typeface="Arial" pitchFamily="34" charset="0"/>
+              </a:rPr>
               <a:t>Invite </a:t>
             </a:r>
             <a:r>
-              <a:rPr lang="en-US" sz="2800" smtClean="0"/>
+              <a:rPr lang="en-US" sz="2800" dirty="0" smtClean="0">
+                <a:latin typeface="Arial" pitchFamily="34" charset="0"/>
+                <a:cs typeface="Arial" pitchFamily="34" charset="0"/>
+              </a:rPr>
               <a:t>1-3 </a:t>
             </a:r>
             <a:r>
-              <a:rPr lang="en-US" sz="2800" dirty="0" smtClean="0"/>
+              <a:rPr lang="en-US" sz="2800" dirty="0" smtClean="0">
+                <a:latin typeface="Arial" pitchFamily="34" charset="0"/>
+                <a:cs typeface="Arial" pitchFamily="34" charset="0"/>
+              </a:rPr>
               <a:t>friends</a:t>
             </a:r>
-            <a:endParaRPr lang="de-DE" sz="2800" dirty="0"/>
+            <a:endParaRPr lang="de-DE" sz="2800" dirty="0">
+              <a:latin typeface="Arial" pitchFamily="34" charset="0"/>
+              <a:cs typeface="Arial" pitchFamily="34" charset="0"/>
+            </a:endParaRPr>
           </a:p>
         </p:txBody>
       </p:sp>
@@ -4069,14 +4099,23 @@
           <a:lstStyle/>
           <a:p>
             <a:r>
-              <a:rPr lang="en-US" sz="2800" dirty="0" smtClean="0"/>
+              <a:rPr lang="en-US" sz="2800" dirty="0" smtClean="0">
+                <a:latin typeface="Arial" pitchFamily="34" charset="0"/>
+                <a:cs typeface="Arial" pitchFamily="34" charset="0"/>
+              </a:rPr>
               <a:t>Start </a:t>
             </a:r>
             <a:r>
-              <a:rPr lang="en-US" sz="2800" dirty="0" err="1" smtClean="0"/>
+              <a:rPr lang="en-US" sz="2800" dirty="0" err="1" smtClean="0">
+                <a:latin typeface="Arial" pitchFamily="34" charset="0"/>
+                <a:cs typeface="Arial" pitchFamily="34" charset="0"/>
+              </a:rPr>
               <a:t>VirusX</a:t>
             </a:r>
-            <a:endParaRPr lang="de-DE" sz="2800" dirty="0"/>
+            <a:endParaRPr lang="de-DE" sz="2800" dirty="0">
+              <a:latin typeface="Arial" pitchFamily="34" charset="0"/>
+              <a:cs typeface="Arial" pitchFamily="34" charset="0"/>
+            </a:endParaRPr>
           </a:p>
         </p:txBody>
       </p:sp>
@@ -4105,10 +4144,16 @@
           <a:lstStyle/>
           <a:p>
             <a:r>
-              <a:rPr lang="en-US" sz="2800" dirty="0" smtClean="0"/>
+              <a:rPr lang="en-US" sz="2800" dirty="0" smtClean="0">
+                <a:latin typeface="Arial" pitchFamily="34" charset="0"/>
+                <a:cs typeface="Arial" pitchFamily="34" charset="0"/>
+              </a:rPr>
               <a:t>Have fun!</a:t>
             </a:r>
-            <a:endParaRPr lang="de-DE" sz="2800" dirty="0"/>
+            <a:endParaRPr lang="de-DE" sz="2800" dirty="0">
+              <a:latin typeface="Arial" pitchFamily="34" charset="0"/>
+              <a:cs typeface="Arial" pitchFamily="34" charset="0"/>
+            </a:endParaRPr>
           </a:p>
         </p:txBody>
       </p:sp>
@@ -4289,13 +4334,13 @@
               </a:ext>
             </a:extLst>
           </a:blip>
-          <a:srcRect l="5829" t="60505" r="64373" b="13592"/>
+          <a:srcRect l="58" t="59870" r="55049" b="14227"/>
           <a:stretch/>
         </p:blipFill>
         <p:spPr bwMode="auto">
           <a:xfrm>
             <a:off x="478103" y="2629298"/>
-            <a:ext cx="5449523" cy="2664693"/>
+            <a:ext cx="8210160" cy="2664693"/>
           </a:xfrm>
           <a:prstGeom prst="rect">
             <a:avLst/>
@@ -4337,21 +4382,55 @@
           <a:lstStyle/>
           <a:p>
             <a:r>
-              <a:rPr lang="en-US" sz="2800" dirty="0" smtClean="0"/>
-              <a:t>Move your </a:t>
-            </a:r>
-            <a:r>
               <a:rPr lang="en-US" sz="2800" dirty="0" smtClean="0">
                 <a:latin typeface="Arial" pitchFamily="34" charset="0"/>
                 <a:cs typeface="Arial" pitchFamily="34" charset="0"/>
               </a:rPr>
-              <a:t>viruses</a:t>
-            </a:r>
-            <a:r>
-              <a:rPr lang="en-US" sz="2800" dirty="0" smtClean="0"/>
-              <a:t> using your cursor</a:t>
-            </a:r>
-            <a:endParaRPr lang="de-DE" sz="2800" dirty="0"/>
+              <a:t>Move your viruses using your cursor</a:t>
+            </a:r>
+            <a:endParaRPr lang="de-DE" sz="2800" dirty="0">
+              <a:latin typeface="Arial" pitchFamily="34" charset="0"/>
+              <a:cs typeface="Arial" pitchFamily="34" charset="0"/>
+            </a:endParaRPr>
+          </a:p>
+        </p:txBody>
+      </p:sp>
+      <p:sp>
+        <p:nvSpPr>
+          <p:cNvPr id="6" name="Textfeld 5"/>
+          <p:cNvSpPr txBox="1"/>
+          <p:nvPr/>
+        </p:nvSpPr>
+        <p:spPr>
+          <a:xfrm>
+            <a:off x="1991519" y="5509618"/>
+            <a:ext cx="6696744" cy="523220"/>
+          </a:xfrm>
+          <a:prstGeom prst="rect">
+            <a:avLst/>
+          </a:prstGeom>
+          <a:solidFill>
+            <a:schemeClr val="bg1"/>
+          </a:solidFill>
+        </p:spPr>
+        <p:txBody>
+          <a:bodyPr wrap="square" rtlCol="0">
+            <a:spAutoFit/>
+          </a:bodyPr>
+          <a:lstStyle/>
+          <a:p>
+            <a:pPr algn="r"/>
+            <a:r>
+              <a:rPr lang="en-US" sz="2800" dirty="0" smtClean="0">
+                <a:latin typeface="Arial" pitchFamily="34" charset="0"/>
+                <a:cs typeface="Arial" pitchFamily="34" charset="0"/>
+              </a:rPr>
+              <a:t>Nuclei produce new viruses</a:t>
+            </a:r>
+            <a:endParaRPr lang="de-DE" sz="2800" dirty="0">
+              <a:latin typeface="Arial" pitchFamily="34" charset="0"/>
+              <a:cs typeface="Arial" pitchFamily="34" charset="0"/>
+            </a:endParaRPr>
           </a:p>
         </p:txBody>
       </p:sp>
@@ -4651,7 +4730,7 @@
         </p:blipFill>
         <p:spPr bwMode="auto">
           <a:xfrm>
-            <a:off x="5754828" y="2625260"/>
+            <a:off x="5785830" y="2633364"/>
             <a:ext cx="2902433" cy="2658700"/>
           </a:xfrm>
           <a:prstGeom prst="rect">
@@ -5055,7 +5134,21 @@
                 <a:latin typeface="Arial" pitchFamily="34" charset="0"/>
                 <a:cs typeface="Arial" pitchFamily="34" charset="0"/>
               </a:rPr>
-              <a:t>Safe Zone	- kills opponent’s virus</a:t>
+              <a:t>Safe Zone	- kills </a:t>
+            </a:r>
+            <a:r>
+              <a:rPr lang="en-US" sz="2800" smtClean="0">
+                <a:latin typeface="Arial" pitchFamily="34" charset="0"/>
+                <a:cs typeface="Arial" pitchFamily="34" charset="0"/>
+              </a:rPr>
+              <a:t>opponent’s </a:t>
+            </a:r>
+            <a:r>
+              <a:rPr lang="en-US" sz="2800" smtClean="0">
+                <a:latin typeface="Arial" pitchFamily="34" charset="0"/>
+                <a:cs typeface="Arial" pitchFamily="34" charset="0"/>
+              </a:rPr>
+              <a:t>viruses</a:t>
             </a:r>
             <a:endParaRPr lang="de-DE" sz="2800" dirty="0">
               <a:latin typeface="Arial" pitchFamily="34" charset="0"/>
@@ -5413,7 +5506,7 @@
         </p:blipFill>
         <p:spPr bwMode="auto">
           <a:xfrm>
-            <a:off x="4716016" y="2628900"/>
+            <a:off x="4753173" y="2628899"/>
             <a:ext cx="3957456" cy="2676191"/>
           </a:xfrm>
           <a:prstGeom prst="rect">

</xml_diff>